<commit_message>
Updated sections for W1 slides.
</commit_message>
<xml_diff>
--- a/W1/0. All/W1.pptx
+++ b/W1/0. All/W1.pptx
@@ -5,7 +5,7 @@
     <p:sldMasterId id="2147483648" r:id="rId1"/>
   </p:sldMasterIdLst>
   <p:notesMasterIdLst>
-    <p:notesMasterId r:id="rId40"/>
+    <p:notesMasterId r:id="rId46"/>
   </p:notesMasterIdLst>
   <p:sldIdLst>
     <p:sldId id="377" r:id="rId2"/>
@@ -43,9 +43,15 @@
     <p:sldId id="403" r:id="rId34"/>
     <p:sldId id="404" r:id="rId35"/>
     <p:sldId id="405" r:id="rId36"/>
-    <p:sldId id="346" r:id="rId37"/>
-    <p:sldId id="267" r:id="rId38"/>
-    <p:sldId id="266" r:id="rId39"/>
+    <p:sldId id="407" r:id="rId37"/>
+    <p:sldId id="408" r:id="rId38"/>
+    <p:sldId id="409" r:id="rId39"/>
+    <p:sldId id="410" r:id="rId40"/>
+    <p:sldId id="411" r:id="rId41"/>
+    <p:sldId id="412" r:id="rId42"/>
+    <p:sldId id="346" r:id="rId43"/>
+    <p:sldId id="267" r:id="rId44"/>
+    <p:sldId id="266" r:id="rId45"/>
   </p:sldIdLst>
   <p:sldSz cx="12192000" cy="6858000"/>
   <p:notesSz cx="6858000" cy="9144000"/>
@@ -210,6 +216,36 @@
             <p14:sldId id="405"/>
           </p14:sldIdLst>
         </p14:section>
+        <p14:section name="II.2. Solving the linear regression problem analytically" id="{5AC599D5-9DB1-455E-A49B-B34B9DDC9702}">
+          <p14:sldIdLst>
+            <p14:sldId id="407"/>
+          </p14:sldIdLst>
+        </p14:section>
+        <p14:section name="II.3. Solving the linear regression problem with gradient descent" id="{3D459045-5515-4E4A-A7FB-662E43EAD6A0}">
+          <p14:sldIdLst>
+            <p14:sldId id="408"/>
+          </p14:sldIdLst>
+        </p14:section>
+        <p14:section name="III.1. The polynomial regression problem" id="{4BDA5BE6-5576-43FF-9767-D2658405EACE}">
+          <p14:sldIdLst>
+            <p14:sldId id="409"/>
+          </p14:sldIdLst>
+        </p14:section>
+        <p14:section name="III.2. Polynomial degree vs. Overfitting" id="{5E89B948-797A-4A25-9F0B-DF21A2037136}">
+          <p14:sldIdLst>
+            <p14:sldId id="410"/>
+          </p14:sldIdLst>
+        </p14:section>
+        <p14:section name="III.3. A quick note on train/test split and Overfitting" id="{A3201B08-EEB7-4000-AAC2-22F4F2EA82D3}">
+          <p14:sldIdLst>
+            <p14:sldId id="411"/>
+          </p14:sldIdLst>
+        </p14:section>
+        <p14:section name="III.4. The Ridge regression and its effect on Overfitting" id="{4843ECD2-5AC4-41CC-8394-8DBC4B386E8D}">
+          <p14:sldIdLst>
+            <p14:sldId id="412"/>
+          </p14:sldIdLst>
+        </p14:section>
         <p14:section name="Conclusion" id="{09807B6E-2B76-45C8-B103-96D5021B68A6}">
           <p14:sldIdLst>
             <p14:sldId id="346"/>
@@ -239,7 +275,7 @@
 <file path=ppt/revisionInfo.xml><?xml version="1.0" encoding="utf-8"?>
 <p1510:revInfo xmlns:a="http://schemas.openxmlformats.org/drawingml/2006/main" xmlns:r="http://schemas.openxmlformats.org/officeDocument/2006/relationships" xmlns:p1510="http://schemas.microsoft.com/office/powerpoint/2015/10/main">
   <p1510:revLst>
-    <p1510:client id="{8EE40018-26BD-4A7B-8D17-70AC8417C2D0}" v="148" dt="2022-11-16T09:45:34.326"/>
+    <p1510:client id="{8EE40018-26BD-4A7B-8D17-70AC8417C2D0}" v="154" dt="2022-12-05T10:09:38.943"/>
   </p1510:revLst>
 </p1510:revInfo>
 </file>
@@ -249,7 +285,7 @@
   <pc:docChgLst>
     <pc:chgData name="Matthieu De Mari" userId="dfb708c9-d8dc-439f-9a3b-c772bf4a311c" providerId="ADAL" clId="{8EE40018-26BD-4A7B-8D17-70AC8417C2D0}"/>
     <pc:docChg chg="undo custSel addSld delSld modSld sldOrd addSection delSection modSection">
-      <pc:chgData name="Matthieu De Mari" userId="dfb708c9-d8dc-439f-9a3b-c772bf4a311c" providerId="ADAL" clId="{8EE40018-26BD-4A7B-8D17-70AC8417C2D0}" dt="2022-11-16T09:49:26.855" v="8285" actId="20577"/>
+      <pc:chgData name="Matthieu De Mari" userId="dfb708c9-d8dc-439f-9a3b-c772bf4a311c" providerId="ADAL" clId="{8EE40018-26BD-4A7B-8D17-70AC8417C2D0}" dt="2022-12-05T10:10:00.559" v="8297" actId="17846"/>
       <pc:docMkLst>
         <pc:docMk/>
       </pc:docMkLst>
@@ -2226,6 +2262,48 @@
             <ac:spMk id="2" creationId="{B2D6E47F-EE41-14EC-57C7-619AC0EC550B}"/>
           </ac:spMkLst>
         </pc:spChg>
+      </pc:sldChg>
+      <pc:sldChg chg="add">
+        <pc:chgData name="Matthieu De Mari" userId="dfb708c9-d8dc-439f-9a3b-c772bf4a311c" providerId="ADAL" clId="{8EE40018-26BD-4A7B-8D17-70AC8417C2D0}" dt="2022-12-05T10:08:03.775" v="8286"/>
+        <pc:sldMkLst>
+          <pc:docMk/>
+          <pc:sldMk cId="3166499987" sldId="407"/>
+        </pc:sldMkLst>
+      </pc:sldChg>
+      <pc:sldChg chg="add">
+        <pc:chgData name="Matthieu De Mari" userId="dfb708c9-d8dc-439f-9a3b-c772bf4a311c" providerId="ADAL" clId="{8EE40018-26BD-4A7B-8D17-70AC8417C2D0}" dt="2022-12-05T10:08:20.960" v="8288"/>
+        <pc:sldMkLst>
+          <pc:docMk/>
+          <pc:sldMk cId="4017563613" sldId="408"/>
+        </pc:sldMkLst>
+      </pc:sldChg>
+      <pc:sldChg chg="add">
+        <pc:chgData name="Matthieu De Mari" userId="dfb708c9-d8dc-439f-9a3b-c772bf4a311c" providerId="ADAL" clId="{8EE40018-26BD-4A7B-8D17-70AC8417C2D0}" dt="2022-12-05T10:08:37.938" v="8290"/>
+        <pc:sldMkLst>
+          <pc:docMk/>
+          <pc:sldMk cId="947346955" sldId="409"/>
+        </pc:sldMkLst>
+      </pc:sldChg>
+      <pc:sldChg chg="add">
+        <pc:chgData name="Matthieu De Mari" userId="dfb708c9-d8dc-439f-9a3b-c772bf4a311c" providerId="ADAL" clId="{8EE40018-26BD-4A7B-8D17-70AC8417C2D0}" dt="2022-12-05T10:08:58.457" v="8292"/>
+        <pc:sldMkLst>
+          <pc:docMk/>
+          <pc:sldMk cId="648139788" sldId="410"/>
+        </pc:sldMkLst>
+      </pc:sldChg>
+      <pc:sldChg chg="add">
+        <pc:chgData name="Matthieu De Mari" userId="dfb708c9-d8dc-439f-9a3b-c772bf4a311c" providerId="ADAL" clId="{8EE40018-26BD-4A7B-8D17-70AC8417C2D0}" dt="2022-12-05T10:09:17.064" v="8294"/>
+        <pc:sldMkLst>
+          <pc:docMk/>
+          <pc:sldMk cId="2039337153" sldId="411"/>
+        </pc:sldMkLst>
+      </pc:sldChg>
+      <pc:sldChg chg="add">
+        <pc:chgData name="Matthieu De Mari" userId="dfb708c9-d8dc-439f-9a3b-c772bf4a311c" providerId="ADAL" clId="{8EE40018-26BD-4A7B-8D17-70AC8417C2D0}" dt="2022-12-05T10:09:38.940" v="8296"/>
+        <pc:sldMkLst>
+          <pc:docMk/>
+          <pc:sldMk cId="1377302654" sldId="412"/>
+        </pc:sldMkLst>
       </pc:sldChg>
     </pc:docChg>
   </pc:docChgLst>
@@ -28312,7 +28390,7 @@
           <a:p>
             <a:fld id="{61478373-EB31-4867-8CF0-FA31364748A5}" type="datetimeFigureOut">
               <a:rPr lang="en-GB" smtClean="0"/>
-              <a:t>16/11/2022</a:t>
+              <a:t>05/12/2022</a:t>
             </a:fld>
             <a:endParaRPr lang="en-GB"/>
           </a:p>
@@ -28729,7 +28807,7 @@
           <a:p>
             <a:fld id="{E85DF616-B21E-4EF6-A6A5-95E2FB3EB1A1}" type="datetimeFigureOut">
               <a:rPr lang="en-GB" smtClean="0"/>
-              <a:t>16/11/2022</a:t>
+              <a:t>05/12/2022</a:t>
             </a:fld>
             <a:endParaRPr lang="en-GB"/>
           </a:p>
@@ -28929,7 +29007,7 @@
           <a:p>
             <a:fld id="{E85DF616-B21E-4EF6-A6A5-95E2FB3EB1A1}" type="datetimeFigureOut">
               <a:rPr lang="en-GB" smtClean="0"/>
-              <a:t>16/11/2022</a:t>
+              <a:t>05/12/2022</a:t>
             </a:fld>
             <a:endParaRPr lang="en-GB"/>
           </a:p>
@@ -29139,7 +29217,7 @@
           <a:p>
             <a:fld id="{E85DF616-B21E-4EF6-A6A5-95E2FB3EB1A1}" type="datetimeFigureOut">
               <a:rPr lang="en-GB" smtClean="0"/>
-              <a:t>16/11/2022</a:t>
+              <a:t>05/12/2022</a:t>
             </a:fld>
             <a:endParaRPr lang="en-GB"/>
           </a:p>
@@ -29339,7 +29417,7 @@
           <a:p>
             <a:fld id="{E85DF616-B21E-4EF6-A6A5-95E2FB3EB1A1}" type="datetimeFigureOut">
               <a:rPr lang="en-GB" smtClean="0"/>
-              <a:t>16/11/2022</a:t>
+              <a:t>05/12/2022</a:t>
             </a:fld>
             <a:endParaRPr lang="en-GB"/>
           </a:p>
@@ -29615,7 +29693,7 @@
           <a:p>
             <a:fld id="{E85DF616-B21E-4EF6-A6A5-95E2FB3EB1A1}" type="datetimeFigureOut">
               <a:rPr lang="en-GB" smtClean="0"/>
-              <a:t>16/11/2022</a:t>
+              <a:t>05/12/2022</a:t>
             </a:fld>
             <a:endParaRPr lang="en-GB"/>
           </a:p>
@@ -29883,7 +29961,7 @@
           <a:p>
             <a:fld id="{E85DF616-B21E-4EF6-A6A5-95E2FB3EB1A1}" type="datetimeFigureOut">
               <a:rPr lang="en-GB" smtClean="0"/>
-              <a:t>16/11/2022</a:t>
+              <a:t>05/12/2022</a:t>
             </a:fld>
             <a:endParaRPr lang="en-GB"/>
           </a:p>
@@ -30298,7 +30376,7 @@
           <a:p>
             <a:fld id="{E85DF616-B21E-4EF6-A6A5-95E2FB3EB1A1}" type="datetimeFigureOut">
               <a:rPr lang="en-GB" smtClean="0"/>
-              <a:t>16/11/2022</a:t>
+              <a:t>05/12/2022</a:t>
             </a:fld>
             <a:endParaRPr lang="en-GB"/>
           </a:p>
@@ -30440,7 +30518,7 @@
           <a:p>
             <a:fld id="{E85DF616-B21E-4EF6-A6A5-95E2FB3EB1A1}" type="datetimeFigureOut">
               <a:rPr lang="en-GB" smtClean="0"/>
-              <a:t>16/11/2022</a:t>
+              <a:t>05/12/2022</a:t>
             </a:fld>
             <a:endParaRPr lang="en-GB"/>
           </a:p>
@@ -30553,7 +30631,7 @@
           <a:p>
             <a:fld id="{E85DF616-B21E-4EF6-A6A5-95E2FB3EB1A1}" type="datetimeFigureOut">
               <a:rPr lang="en-GB" smtClean="0"/>
-              <a:t>16/11/2022</a:t>
+              <a:t>05/12/2022</a:t>
             </a:fld>
             <a:endParaRPr lang="en-GB"/>
           </a:p>
@@ -30866,7 +30944,7 @@
           <a:p>
             <a:fld id="{E85DF616-B21E-4EF6-A6A5-95E2FB3EB1A1}" type="datetimeFigureOut">
               <a:rPr lang="en-GB" smtClean="0"/>
-              <a:t>16/11/2022</a:t>
+              <a:t>05/12/2022</a:t>
             </a:fld>
             <a:endParaRPr lang="en-GB"/>
           </a:p>
@@ -31155,7 +31233,7 @@
           <a:p>
             <a:fld id="{E85DF616-B21E-4EF6-A6A5-95E2FB3EB1A1}" type="datetimeFigureOut">
               <a:rPr lang="en-GB" smtClean="0"/>
-              <a:t>16/11/2022</a:t>
+              <a:t>05/12/2022</a:t>
             </a:fld>
             <a:endParaRPr lang="en-GB"/>
           </a:p>
@@ -31398,7 +31476,7 @@
           <a:p>
             <a:fld id="{E85DF616-B21E-4EF6-A6A5-95E2FB3EB1A1}" type="datetimeFigureOut">
               <a:rPr lang="en-GB" smtClean="0"/>
-              <a:t>16/11/2022</a:t>
+              <a:t>05/12/2022</a:t>
             </a:fld>
             <a:endParaRPr lang="en-GB"/>
           </a:p>
@@ -38289,7 +38367,7 @@
           <p:cNvPr id="2" name="Title 1">
             <a:extLst>
               <a:ext uri="{FF2B5EF4-FFF2-40B4-BE49-F238E27FC236}">
-                <a16:creationId xmlns:a16="http://schemas.microsoft.com/office/drawing/2014/main" id="{11A08BA8-9DEC-4471-8590-434E8D8BB4A0}"/>
+                <a16:creationId xmlns:a16="http://schemas.microsoft.com/office/drawing/2014/main" id="{1D3B68C2-4970-4C7E-1F52-6140F374C9AD}"/>
               </a:ext>
             </a:extLst>
           </p:cNvPr>
@@ -38305,11 +38383,7 @@
           <a:bodyPr/>
           <a:lstStyle/>
           <a:p>
-            <a:r>
-              <a:rPr lang="en-US" dirty="0"/>
-              <a:t>Conclusion (W1S1)</a:t>
-            </a:r>
-            <a:endParaRPr lang="en-GB" dirty="0"/>
+            <a:endParaRPr lang="en-SG"/>
           </a:p>
         </p:txBody>
       </p:sp>
@@ -38318,7 +38392,7 @@
           <p:cNvPr id="3" name="Content Placeholder 2">
             <a:extLst>
               <a:ext uri="{FF2B5EF4-FFF2-40B4-BE49-F238E27FC236}">
-                <a16:creationId xmlns:a16="http://schemas.microsoft.com/office/drawing/2014/main" id="{47E3549C-D723-41E6-8478-270ACE043694}"/>
+                <a16:creationId xmlns:a16="http://schemas.microsoft.com/office/drawing/2014/main" id="{7BDE96C0-465C-7952-04EA-C267AC8BF678}"/>
               </a:ext>
             </a:extLst>
           </p:cNvPr>
@@ -38329,23 +38403,12 @@
             <p:ph sz="half" idx="1"/>
           </p:nvPr>
         </p:nvSpPr>
-        <p:spPr>
-          <a:xfrm>
-            <a:off x="838200" y="1825624"/>
-            <a:ext cx="5257800" cy="5032375"/>
-          </a:xfrm>
-        </p:spPr>
+        <p:spPr/>
         <p:txBody>
-          <a:bodyPr>
-            <a:normAutofit/>
-          </a:bodyPr>
+          <a:bodyPr/>
           <a:lstStyle/>
           <a:p>
-            <a:r>
-              <a:rPr lang="en-US" dirty="0"/>
-              <a:t>XXX</a:t>
-            </a:r>
-            <a:endParaRPr lang="en-GB" dirty="0"/>
+            <a:endParaRPr lang="en-SG"/>
           </a:p>
         </p:txBody>
       </p:sp>
@@ -38354,7 +38417,7 @@
           <p:cNvPr id="4" name="Content Placeholder 3">
             <a:extLst>
               <a:ext uri="{FF2B5EF4-FFF2-40B4-BE49-F238E27FC236}">
-                <a16:creationId xmlns:a16="http://schemas.microsoft.com/office/drawing/2014/main" id="{7E420A50-DCDA-4FEF-986F-775F53063E3A}"/>
+                <a16:creationId xmlns:a16="http://schemas.microsoft.com/office/drawing/2014/main" id="{5E76589E-870E-419D-CF95-4309EACDB190}"/>
               </a:ext>
             </a:extLst>
           </p:cNvPr>
@@ -38365,30 +38428,19 @@
             <p:ph sz="half" idx="2"/>
           </p:nvPr>
         </p:nvSpPr>
-        <p:spPr>
-          <a:xfrm>
-            <a:off x="6172200" y="1825624"/>
-            <a:ext cx="5181600" cy="5032375"/>
-          </a:xfrm>
-        </p:spPr>
+        <p:spPr/>
         <p:txBody>
-          <a:bodyPr>
-            <a:normAutofit/>
-          </a:bodyPr>
+          <a:bodyPr/>
           <a:lstStyle/>
           <a:p>
-            <a:r>
-              <a:rPr lang="en-US" dirty="0"/>
-              <a:t>XXX</a:t>
-            </a:r>
-            <a:endParaRPr lang="en-GB" dirty="0"/>
+            <a:endParaRPr lang="en-SG"/>
           </a:p>
         </p:txBody>
       </p:sp>
     </p:spTree>
     <p:extLst>
       <p:ext uri="{BB962C8B-B14F-4D97-AF65-F5344CB8AC3E}">
-        <p14:creationId xmlns:p14="http://schemas.microsoft.com/office/powerpoint/2010/main" val="1036081419"/>
+        <p14:creationId xmlns:p14="http://schemas.microsoft.com/office/powerpoint/2010/main" val="3166499987"/>
       </p:ext>
     </p:extLst>
   </p:cSld>
@@ -38420,7 +38472,7 @@
           <p:cNvPr id="2" name="Title 1">
             <a:extLst>
               <a:ext uri="{FF2B5EF4-FFF2-40B4-BE49-F238E27FC236}">
-                <a16:creationId xmlns:a16="http://schemas.microsoft.com/office/drawing/2014/main" id="{F6E33F64-ACBF-414C-8E71-06E4F9517B15}"/>
+                <a16:creationId xmlns:a16="http://schemas.microsoft.com/office/drawing/2014/main" id="{1D3B68C2-4970-4C7E-1F52-6140F374C9AD}"/>
               </a:ext>
             </a:extLst>
           </p:cNvPr>
@@ -38436,11 +38488,7 @@
           <a:bodyPr/>
           <a:lstStyle/>
           <a:p>
-            <a:r>
-              <a:rPr lang="en-US" dirty="0"/>
-              <a:t>Learn more about these topics</a:t>
-            </a:r>
-            <a:endParaRPr lang="en-GB" dirty="0"/>
+            <a:endParaRPr lang="en-SG"/>
           </a:p>
         </p:txBody>
       </p:sp>
@@ -38449,7 +38497,7 @@
           <p:cNvPr id="3" name="Content Placeholder 2">
             <a:extLst>
               <a:ext uri="{FF2B5EF4-FFF2-40B4-BE49-F238E27FC236}">
-                <a16:creationId xmlns:a16="http://schemas.microsoft.com/office/drawing/2014/main" id="{C71C8DD6-14D1-44DF-9843-EFEDF44E39A2}"/>
+                <a16:creationId xmlns:a16="http://schemas.microsoft.com/office/drawing/2014/main" id="{7BDE96C0-465C-7952-04EA-C267AC8BF678}"/>
               </a:ext>
             </a:extLst>
           </p:cNvPr>
@@ -38457,47 +38505,47 @@
             <a:spLocks noGrp="1"/>
           </p:cNvSpPr>
           <p:nvPr>
-            <p:ph idx="1"/>
+            <p:ph sz="half" idx="1"/>
           </p:nvPr>
         </p:nvSpPr>
-        <p:spPr>
-          <a:xfrm>
-            <a:off x="838200" y="1825624"/>
-            <a:ext cx="10515600" cy="5032375"/>
-          </a:xfrm>
-        </p:spPr>
+        <p:spPr/>
         <p:txBody>
-          <a:bodyPr>
-            <a:normAutofit/>
-          </a:bodyPr>
+          <a:bodyPr/>
           <a:lstStyle/>
           <a:p>
-            <a:pPr marL="0" indent="0">
-              <a:buNone/>
-            </a:pPr>
-            <a:r>
-              <a:rPr lang="en-US" dirty="0"/>
-              <a:t>Out of class, supporting papers, for those of you who are curious.</a:t>
-            </a:r>
+            <a:endParaRPr lang="en-SG"/>
           </a:p>
+        </p:txBody>
+      </p:sp>
+      <p:sp>
+        <p:nvSpPr>
+          <p:cNvPr id="4" name="Content Placeholder 3">
+            <a:extLst>
+              <a:ext uri="{FF2B5EF4-FFF2-40B4-BE49-F238E27FC236}">
+                <a16:creationId xmlns:a16="http://schemas.microsoft.com/office/drawing/2014/main" id="{5E76589E-870E-419D-CF95-4309EACDB190}"/>
+              </a:ext>
+            </a:extLst>
+          </p:cNvPr>
+          <p:cNvSpPr>
+            <a:spLocks noGrp="1"/>
+          </p:cNvSpPr>
+          <p:nvPr>
+            <p:ph sz="half" idx="2"/>
+          </p:nvPr>
+        </p:nvSpPr>
+        <p:spPr/>
+        <p:txBody>
+          <a:bodyPr/>
+          <a:lstStyle/>
           <a:p>
-            <a:endParaRPr lang="en-US" dirty="0"/>
-          </a:p>
-          <a:p>
-            <a:r>
-              <a:rPr lang="en-US" dirty="0"/>
-              <a:t>[XXX] XXX</a:t>
-            </a:r>
-          </a:p>
-          <a:p>
-            <a:endParaRPr lang="en-GB" dirty="0"/>
+            <a:endParaRPr lang="en-SG"/>
           </a:p>
         </p:txBody>
       </p:sp>
     </p:spTree>
     <p:extLst>
       <p:ext uri="{BB962C8B-B14F-4D97-AF65-F5344CB8AC3E}">
-        <p14:creationId xmlns:p14="http://schemas.microsoft.com/office/powerpoint/2010/main" val="3880949074"/>
+        <p14:creationId xmlns:p14="http://schemas.microsoft.com/office/powerpoint/2010/main" val="4017563613"/>
       </p:ext>
     </p:extLst>
   </p:cSld>
@@ -38529,7 +38577,7 @@
           <p:cNvPr id="2" name="Title 1">
             <a:extLst>
               <a:ext uri="{FF2B5EF4-FFF2-40B4-BE49-F238E27FC236}">
-                <a16:creationId xmlns:a16="http://schemas.microsoft.com/office/drawing/2014/main" id="{999B9715-ECD1-470D-B523-53C9DD5C7678}"/>
+                <a16:creationId xmlns:a16="http://schemas.microsoft.com/office/drawing/2014/main" id="{1D3B68C2-4970-4C7E-1F52-6140F374C9AD}"/>
               </a:ext>
             </a:extLst>
           </p:cNvPr>
@@ -38545,20 +38593,16 @@
           <a:bodyPr/>
           <a:lstStyle/>
           <a:p>
-            <a:r>
-              <a:rPr lang="en-US" dirty="0"/>
-              <a:t>Learn more about these topics</a:t>
-            </a:r>
-            <a:endParaRPr lang="en-GB" dirty="0"/>
+            <a:endParaRPr lang="en-SG"/>
           </a:p>
         </p:txBody>
       </p:sp>
       <p:sp>
         <p:nvSpPr>
-          <p:cNvPr id="5" name="Content Placeholder 4">
+          <p:cNvPr id="3" name="Content Placeholder 2">
             <a:extLst>
               <a:ext uri="{FF2B5EF4-FFF2-40B4-BE49-F238E27FC236}">
-                <a16:creationId xmlns:a16="http://schemas.microsoft.com/office/drawing/2014/main" id="{7D0CB248-82F3-414A-84E4-14EF63C7FB27}"/>
+                <a16:creationId xmlns:a16="http://schemas.microsoft.com/office/drawing/2014/main" id="{7BDE96C0-465C-7952-04EA-C267AC8BF678}"/>
               </a:ext>
             </a:extLst>
           </p:cNvPr>
@@ -38566,44 +38610,152 @@
             <a:spLocks noGrp="1"/>
           </p:cNvSpPr>
           <p:nvPr>
-            <p:ph idx="1"/>
+            <p:ph sz="half" idx="1"/>
           </p:nvPr>
         </p:nvSpPr>
-        <p:spPr>
-          <a:xfrm>
-            <a:off x="838200" y="1825624"/>
-            <a:ext cx="10515600" cy="5032375"/>
-          </a:xfrm>
-        </p:spPr>
+        <p:spPr/>
         <p:txBody>
-          <a:bodyPr>
-            <a:normAutofit/>
-          </a:bodyPr>
+          <a:bodyPr/>
           <a:lstStyle/>
           <a:p>
-            <a:pPr marL="0" indent="0">
-              <a:buNone/>
-            </a:pPr>
-            <a:r>
-              <a:rPr lang="en-GB" dirty="0"/>
-              <a:t>Some extra (easy) reading and videos for those of you who are curious.</a:t>
-            </a:r>
+            <a:endParaRPr lang="en-SG"/>
           </a:p>
+        </p:txBody>
+      </p:sp>
+      <p:sp>
+        <p:nvSpPr>
+          <p:cNvPr id="4" name="Content Placeholder 3">
+            <a:extLst>
+              <a:ext uri="{FF2B5EF4-FFF2-40B4-BE49-F238E27FC236}">
+                <a16:creationId xmlns:a16="http://schemas.microsoft.com/office/drawing/2014/main" id="{5E76589E-870E-419D-CF95-4309EACDB190}"/>
+              </a:ext>
+            </a:extLst>
+          </p:cNvPr>
+          <p:cNvSpPr>
+            <a:spLocks noGrp="1"/>
+          </p:cNvSpPr>
+          <p:nvPr>
+            <p:ph sz="half" idx="2"/>
+          </p:nvPr>
+        </p:nvSpPr>
+        <p:spPr/>
+        <p:txBody>
+          <a:bodyPr/>
+          <a:lstStyle/>
           <a:p>
-            <a:r>
-              <a:rPr lang="en-GB" dirty="0"/>
-              <a:t>[XXX] XXX</a:t>
-            </a:r>
-          </a:p>
-          <a:p>
-            <a:endParaRPr lang="en-GB" dirty="0"/>
+            <a:endParaRPr lang="en-SG"/>
           </a:p>
         </p:txBody>
       </p:sp>
     </p:spTree>
     <p:extLst>
       <p:ext uri="{BB962C8B-B14F-4D97-AF65-F5344CB8AC3E}">
-        <p14:creationId xmlns:p14="http://schemas.microsoft.com/office/powerpoint/2010/main" val="1893873068"/>
+        <p14:creationId xmlns:p14="http://schemas.microsoft.com/office/powerpoint/2010/main" val="947346955"/>
+      </p:ext>
+    </p:extLst>
+  </p:cSld>
+  <p:clrMapOvr>
+    <a:masterClrMapping/>
+  </p:clrMapOvr>
+</p:sld>
+</file>
+
+<file path=ppt/slides/slide39.xml><?xml version="1.0" encoding="utf-8"?>
+<p:sld xmlns:a="http://schemas.openxmlformats.org/drawingml/2006/main" xmlns:r="http://schemas.openxmlformats.org/officeDocument/2006/relationships" xmlns:p="http://schemas.openxmlformats.org/presentationml/2006/main">
+  <p:cSld>
+    <p:spTree>
+      <p:nvGrpSpPr>
+        <p:cNvPr id="1" name=""/>
+        <p:cNvGrpSpPr/>
+        <p:nvPr/>
+      </p:nvGrpSpPr>
+      <p:grpSpPr>
+        <a:xfrm>
+          <a:off x="0" y="0"/>
+          <a:ext cx="0" cy="0"/>
+          <a:chOff x="0" y="0"/>
+          <a:chExt cx="0" cy="0"/>
+        </a:xfrm>
+      </p:grpSpPr>
+      <p:sp>
+        <p:nvSpPr>
+          <p:cNvPr id="2" name="Title 1">
+            <a:extLst>
+              <a:ext uri="{FF2B5EF4-FFF2-40B4-BE49-F238E27FC236}">
+                <a16:creationId xmlns:a16="http://schemas.microsoft.com/office/drawing/2014/main" id="{1D3B68C2-4970-4C7E-1F52-6140F374C9AD}"/>
+              </a:ext>
+            </a:extLst>
+          </p:cNvPr>
+          <p:cNvSpPr>
+            <a:spLocks noGrp="1"/>
+          </p:cNvSpPr>
+          <p:nvPr>
+            <p:ph type="title"/>
+          </p:nvPr>
+        </p:nvSpPr>
+        <p:spPr/>
+        <p:txBody>
+          <a:bodyPr/>
+          <a:lstStyle/>
+          <a:p>
+            <a:endParaRPr lang="en-SG"/>
+          </a:p>
+        </p:txBody>
+      </p:sp>
+      <p:sp>
+        <p:nvSpPr>
+          <p:cNvPr id="3" name="Content Placeholder 2">
+            <a:extLst>
+              <a:ext uri="{FF2B5EF4-FFF2-40B4-BE49-F238E27FC236}">
+                <a16:creationId xmlns:a16="http://schemas.microsoft.com/office/drawing/2014/main" id="{7BDE96C0-465C-7952-04EA-C267AC8BF678}"/>
+              </a:ext>
+            </a:extLst>
+          </p:cNvPr>
+          <p:cNvSpPr>
+            <a:spLocks noGrp="1"/>
+          </p:cNvSpPr>
+          <p:nvPr>
+            <p:ph sz="half" idx="1"/>
+          </p:nvPr>
+        </p:nvSpPr>
+        <p:spPr/>
+        <p:txBody>
+          <a:bodyPr/>
+          <a:lstStyle/>
+          <a:p>
+            <a:endParaRPr lang="en-SG"/>
+          </a:p>
+        </p:txBody>
+      </p:sp>
+      <p:sp>
+        <p:nvSpPr>
+          <p:cNvPr id="4" name="Content Placeholder 3">
+            <a:extLst>
+              <a:ext uri="{FF2B5EF4-FFF2-40B4-BE49-F238E27FC236}">
+                <a16:creationId xmlns:a16="http://schemas.microsoft.com/office/drawing/2014/main" id="{5E76589E-870E-419D-CF95-4309EACDB190}"/>
+              </a:ext>
+            </a:extLst>
+          </p:cNvPr>
+          <p:cNvSpPr>
+            <a:spLocks noGrp="1"/>
+          </p:cNvSpPr>
+          <p:nvPr>
+            <p:ph sz="half" idx="2"/>
+          </p:nvPr>
+        </p:nvSpPr>
+        <p:spPr/>
+        <p:txBody>
+          <a:bodyPr/>
+          <a:lstStyle/>
+          <a:p>
+            <a:endParaRPr lang="en-SG"/>
+          </a:p>
+        </p:txBody>
+      </p:sp>
+    </p:spTree>
+    <p:extLst>
+      <p:ext uri="{BB962C8B-B14F-4D97-AF65-F5344CB8AC3E}">
+        <p14:creationId xmlns:p14="http://schemas.microsoft.com/office/powerpoint/2010/main" val="648139788"/>
       </p:ext>
     </p:extLst>
   </p:cSld>
@@ -38786,6 +38938,562 @@
     <p:extLst>
       <p:ext uri="{BB962C8B-B14F-4D97-AF65-F5344CB8AC3E}">
         <p14:creationId xmlns:p14="http://schemas.microsoft.com/office/powerpoint/2010/main" val="2102240919"/>
+      </p:ext>
+    </p:extLst>
+  </p:cSld>
+  <p:clrMapOvr>
+    <a:masterClrMapping/>
+  </p:clrMapOvr>
+</p:sld>
+</file>
+
+<file path=ppt/slides/slide40.xml><?xml version="1.0" encoding="utf-8"?>
+<p:sld xmlns:a="http://schemas.openxmlformats.org/drawingml/2006/main" xmlns:r="http://schemas.openxmlformats.org/officeDocument/2006/relationships" xmlns:p="http://schemas.openxmlformats.org/presentationml/2006/main">
+  <p:cSld>
+    <p:spTree>
+      <p:nvGrpSpPr>
+        <p:cNvPr id="1" name=""/>
+        <p:cNvGrpSpPr/>
+        <p:nvPr/>
+      </p:nvGrpSpPr>
+      <p:grpSpPr>
+        <a:xfrm>
+          <a:off x="0" y="0"/>
+          <a:ext cx="0" cy="0"/>
+          <a:chOff x="0" y="0"/>
+          <a:chExt cx="0" cy="0"/>
+        </a:xfrm>
+      </p:grpSpPr>
+      <p:sp>
+        <p:nvSpPr>
+          <p:cNvPr id="2" name="Title 1">
+            <a:extLst>
+              <a:ext uri="{FF2B5EF4-FFF2-40B4-BE49-F238E27FC236}">
+                <a16:creationId xmlns:a16="http://schemas.microsoft.com/office/drawing/2014/main" id="{1D3B68C2-4970-4C7E-1F52-6140F374C9AD}"/>
+              </a:ext>
+            </a:extLst>
+          </p:cNvPr>
+          <p:cNvSpPr>
+            <a:spLocks noGrp="1"/>
+          </p:cNvSpPr>
+          <p:nvPr>
+            <p:ph type="title"/>
+          </p:nvPr>
+        </p:nvSpPr>
+        <p:spPr/>
+        <p:txBody>
+          <a:bodyPr/>
+          <a:lstStyle/>
+          <a:p>
+            <a:endParaRPr lang="en-SG"/>
+          </a:p>
+        </p:txBody>
+      </p:sp>
+      <p:sp>
+        <p:nvSpPr>
+          <p:cNvPr id="3" name="Content Placeholder 2">
+            <a:extLst>
+              <a:ext uri="{FF2B5EF4-FFF2-40B4-BE49-F238E27FC236}">
+                <a16:creationId xmlns:a16="http://schemas.microsoft.com/office/drawing/2014/main" id="{7BDE96C0-465C-7952-04EA-C267AC8BF678}"/>
+              </a:ext>
+            </a:extLst>
+          </p:cNvPr>
+          <p:cNvSpPr>
+            <a:spLocks noGrp="1"/>
+          </p:cNvSpPr>
+          <p:nvPr>
+            <p:ph sz="half" idx="1"/>
+          </p:nvPr>
+        </p:nvSpPr>
+        <p:spPr/>
+        <p:txBody>
+          <a:bodyPr/>
+          <a:lstStyle/>
+          <a:p>
+            <a:endParaRPr lang="en-SG"/>
+          </a:p>
+        </p:txBody>
+      </p:sp>
+      <p:sp>
+        <p:nvSpPr>
+          <p:cNvPr id="4" name="Content Placeholder 3">
+            <a:extLst>
+              <a:ext uri="{FF2B5EF4-FFF2-40B4-BE49-F238E27FC236}">
+                <a16:creationId xmlns:a16="http://schemas.microsoft.com/office/drawing/2014/main" id="{5E76589E-870E-419D-CF95-4309EACDB190}"/>
+              </a:ext>
+            </a:extLst>
+          </p:cNvPr>
+          <p:cNvSpPr>
+            <a:spLocks noGrp="1"/>
+          </p:cNvSpPr>
+          <p:nvPr>
+            <p:ph sz="half" idx="2"/>
+          </p:nvPr>
+        </p:nvSpPr>
+        <p:spPr/>
+        <p:txBody>
+          <a:bodyPr/>
+          <a:lstStyle/>
+          <a:p>
+            <a:endParaRPr lang="en-SG"/>
+          </a:p>
+        </p:txBody>
+      </p:sp>
+    </p:spTree>
+    <p:extLst>
+      <p:ext uri="{BB962C8B-B14F-4D97-AF65-F5344CB8AC3E}">
+        <p14:creationId xmlns:p14="http://schemas.microsoft.com/office/powerpoint/2010/main" val="2039337153"/>
+      </p:ext>
+    </p:extLst>
+  </p:cSld>
+  <p:clrMapOvr>
+    <a:masterClrMapping/>
+  </p:clrMapOvr>
+</p:sld>
+</file>
+
+<file path=ppt/slides/slide41.xml><?xml version="1.0" encoding="utf-8"?>
+<p:sld xmlns:a="http://schemas.openxmlformats.org/drawingml/2006/main" xmlns:r="http://schemas.openxmlformats.org/officeDocument/2006/relationships" xmlns:p="http://schemas.openxmlformats.org/presentationml/2006/main">
+  <p:cSld>
+    <p:spTree>
+      <p:nvGrpSpPr>
+        <p:cNvPr id="1" name=""/>
+        <p:cNvGrpSpPr/>
+        <p:nvPr/>
+      </p:nvGrpSpPr>
+      <p:grpSpPr>
+        <a:xfrm>
+          <a:off x="0" y="0"/>
+          <a:ext cx="0" cy="0"/>
+          <a:chOff x="0" y="0"/>
+          <a:chExt cx="0" cy="0"/>
+        </a:xfrm>
+      </p:grpSpPr>
+      <p:sp>
+        <p:nvSpPr>
+          <p:cNvPr id="2" name="Title 1">
+            <a:extLst>
+              <a:ext uri="{FF2B5EF4-FFF2-40B4-BE49-F238E27FC236}">
+                <a16:creationId xmlns:a16="http://schemas.microsoft.com/office/drawing/2014/main" id="{1D3B68C2-4970-4C7E-1F52-6140F374C9AD}"/>
+              </a:ext>
+            </a:extLst>
+          </p:cNvPr>
+          <p:cNvSpPr>
+            <a:spLocks noGrp="1"/>
+          </p:cNvSpPr>
+          <p:nvPr>
+            <p:ph type="title"/>
+          </p:nvPr>
+        </p:nvSpPr>
+        <p:spPr/>
+        <p:txBody>
+          <a:bodyPr/>
+          <a:lstStyle/>
+          <a:p>
+            <a:endParaRPr lang="en-SG"/>
+          </a:p>
+        </p:txBody>
+      </p:sp>
+      <p:sp>
+        <p:nvSpPr>
+          <p:cNvPr id="3" name="Content Placeholder 2">
+            <a:extLst>
+              <a:ext uri="{FF2B5EF4-FFF2-40B4-BE49-F238E27FC236}">
+                <a16:creationId xmlns:a16="http://schemas.microsoft.com/office/drawing/2014/main" id="{7BDE96C0-465C-7952-04EA-C267AC8BF678}"/>
+              </a:ext>
+            </a:extLst>
+          </p:cNvPr>
+          <p:cNvSpPr>
+            <a:spLocks noGrp="1"/>
+          </p:cNvSpPr>
+          <p:nvPr>
+            <p:ph sz="half" idx="1"/>
+          </p:nvPr>
+        </p:nvSpPr>
+        <p:spPr/>
+        <p:txBody>
+          <a:bodyPr/>
+          <a:lstStyle/>
+          <a:p>
+            <a:endParaRPr lang="en-SG"/>
+          </a:p>
+        </p:txBody>
+      </p:sp>
+      <p:sp>
+        <p:nvSpPr>
+          <p:cNvPr id="4" name="Content Placeholder 3">
+            <a:extLst>
+              <a:ext uri="{FF2B5EF4-FFF2-40B4-BE49-F238E27FC236}">
+                <a16:creationId xmlns:a16="http://schemas.microsoft.com/office/drawing/2014/main" id="{5E76589E-870E-419D-CF95-4309EACDB190}"/>
+              </a:ext>
+            </a:extLst>
+          </p:cNvPr>
+          <p:cNvSpPr>
+            <a:spLocks noGrp="1"/>
+          </p:cNvSpPr>
+          <p:nvPr>
+            <p:ph sz="half" idx="2"/>
+          </p:nvPr>
+        </p:nvSpPr>
+        <p:spPr/>
+        <p:txBody>
+          <a:bodyPr/>
+          <a:lstStyle/>
+          <a:p>
+            <a:endParaRPr lang="en-SG"/>
+          </a:p>
+        </p:txBody>
+      </p:sp>
+    </p:spTree>
+    <p:extLst>
+      <p:ext uri="{BB962C8B-B14F-4D97-AF65-F5344CB8AC3E}">
+        <p14:creationId xmlns:p14="http://schemas.microsoft.com/office/powerpoint/2010/main" val="1377302654"/>
+      </p:ext>
+    </p:extLst>
+  </p:cSld>
+  <p:clrMapOvr>
+    <a:masterClrMapping/>
+  </p:clrMapOvr>
+</p:sld>
+</file>
+
+<file path=ppt/slides/slide42.xml><?xml version="1.0" encoding="utf-8"?>
+<p:sld xmlns:a="http://schemas.openxmlformats.org/drawingml/2006/main" xmlns:r="http://schemas.openxmlformats.org/officeDocument/2006/relationships" xmlns:p="http://schemas.openxmlformats.org/presentationml/2006/main">
+  <p:cSld>
+    <p:spTree>
+      <p:nvGrpSpPr>
+        <p:cNvPr id="1" name=""/>
+        <p:cNvGrpSpPr/>
+        <p:nvPr/>
+      </p:nvGrpSpPr>
+      <p:grpSpPr>
+        <a:xfrm>
+          <a:off x="0" y="0"/>
+          <a:ext cx="0" cy="0"/>
+          <a:chOff x="0" y="0"/>
+          <a:chExt cx="0" cy="0"/>
+        </a:xfrm>
+      </p:grpSpPr>
+      <p:sp>
+        <p:nvSpPr>
+          <p:cNvPr id="2" name="Title 1">
+            <a:extLst>
+              <a:ext uri="{FF2B5EF4-FFF2-40B4-BE49-F238E27FC236}">
+                <a16:creationId xmlns:a16="http://schemas.microsoft.com/office/drawing/2014/main" id="{11A08BA8-9DEC-4471-8590-434E8D8BB4A0}"/>
+              </a:ext>
+            </a:extLst>
+          </p:cNvPr>
+          <p:cNvSpPr>
+            <a:spLocks noGrp="1"/>
+          </p:cNvSpPr>
+          <p:nvPr>
+            <p:ph type="title"/>
+          </p:nvPr>
+        </p:nvSpPr>
+        <p:spPr/>
+        <p:txBody>
+          <a:bodyPr/>
+          <a:lstStyle/>
+          <a:p>
+            <a:r>
+              <a:rPr lang="en-US" dirty="0"/>
+              <a:t>Conclusion (W1S1)</a:t>
+            </a:r>
+            <a:endParaRPr lang="en-GB" dirty="0"/>
+          </a:p>
+        </p:txBody>
+      </p:sp>
+      <p:sp>
+        <p:nvSpPr>
+          <p:cNvPr id="3" name="Content Placeholder 2">
+            <a:extLst>
+              <a:ext uri="{FF2B5EF4-FFF2-40B4-BE49-F238E27FC236}">
+                <a16:creationId xmlns:a16="http://schemas.microsoft.com/office/drawing/2014/main" id="{47E3549C-D723-41E6-8478-270ACE043694}"/>
+              </a:ext>
+            </a:extLst>
+          </p:cNvPr>
+          <p:cNvSpPr>
+            <a:spLocks noGrp="1"/>
+          </p:cNvSpPr>
+          <p:nvPr>
+            <p:ph sz="half" idx="1"/>
+          </p:nvPr>
+        </p:nvSpPr>
+        <p:spPr>
+          <a:xfrm>
+            <a:off x="838200" y="1825624"/>
+            <a:ext cx="5257800" cy="5032375"/>
+          </a:xfrm>
+        </p:spPr>
+        <p:txBody>
+          <a:bodyPr>
+            <a:normAutofit/>
+          </a:bodyPr>
+          <a:lstStyle/>
+          <a:p>
+            <a:r>
+              <a:rPr lang="en-US" dirty="0"/>
+              <a:t>XXX</a:t>
+            </a:r>
+            <a:endParaRPr lang="en-GB" dirty="0"/>
+          </a:p>
+        </p:txBody>
+      </p:sp>
+      <p:sp>
+        <p:nvSpPr>
+          <p:cNvPr id="4" name="Content Placeholder 3">
+            <a:extLst>
+              <a:ext uri="{FF2B5EF4-FFF2-40B4-BE49-F238E27FC236}">
+                <a16:creationId xmlns:a16="http://schemas.microsoft.com/office/drawing/2014/main" id="{7E420A50-DCDA-4FEF-986F-775F53063E3A}"/>
+              </a:ext>
+            </a:extLst>
+          </p:cNvPr>
+          <p:cNvSpPr>
+            <a:spLocks noGrp="1"/>
+          </p:cNvSpPr>
+          <p:nvPr>
+            <p:ph sz="half" idx="2"/>
+          </p:nvPr>
+        </p:nvSpPr>
+        <p:spPr>
+          <a:xfrm>
+            <a:off x="6172200" y="1825624"/>
+            <a:ext cx="5181600" cy="5032375"/>
+          </a:xfrm>
+        </p:spPr>
+        <p:txBody>
+          <a:bodyPr>
+            <a:normAutofit/>
+          </a:bodyPr>
+          <a:lstStyle/>
+          <a:p>
+            <a:r>
+              <a:rPr lang="en-US" dirty="0"/>
+              <a:t>XXX</a:t>
+            </a:r>
+            <a:endParaRPr lang="en-GB" dirty="0"/>
+          </a:p>
+        </p:txBody>
+      </p:sp>
+    </p:spTree>
+    <p:extLst>
+      <p:ext uri="{BB962C8B-B14F-4D97-AF65-F5344CB8AC3E}">
+        <p14:creationId xmlns:p14="http://schemas.microsoft.com/office/powerpoint/2010/main" val="1036081419"/>
+      </p:ext>
+    </p:extLst>
+  </p:cSld>
+  <p:clrMapOvr>
+    <a:masterClrMapping/>
+  </p:clrMapOvr>
+</p:sld>
+</file>
+
+<file path=ppt/slides/slide43.xml><?xml version="1.0" encoding="utf-8"?>
+<p:sld xmlns:a="http://schemas.openxmlformats.org/drawingml/2006/main" xmlns:r="http://schemas.openxmlformats.org/officeDocument/2006/relationships" xmlns:p="http://schemas.openxmlformats.org/presentationml/2006/main">
+  <p:cSld>
+    <p:spTree>
+      <p:nvGrpSpPr>
+        <p:cNvPr id="1" name=""/>
+        <p:cNvGrpSpPr/>
+        <p:nvPr/>
+      </p:nvGrpSpPr>
+      <p:grpSpPr>
+        <a:xfrm>
+          <a:off x="0" y="0"/>
+          <a:ext cx="0" cy="0"/>
+          <a:chOff x="0" y="0"/>
+          <a:chExt cx="0" cy="0"/>
+        </a:xfrm>
+      </p:grpSpPr>
+      <p:sp>
+        <p:nvSpPr>
+          <p:cNvPr id="2" name="Title 1">
+            <a:extLst>
+              <a:ext uri="{FF2B5EF4-FFF2-40B4-BE49-F238E27FC236}">
+                <a16:creationId xmlns:a16="http://schemas.microsoft.com/office/drawing/2014/main" id="{F6E33F64-ACBF-414C-8E71-06E4F9517B15}"/>
+              </a:ext>
+            </a:extLst>
+          </p:cNvPr>
+          <p:cNvSpPr>
+            <a:spLocks noGrp="1"/>
+          </p:cNvSpPr>
+          <p:nvPr>
+            <p:ph type="title"/>
+          </p:nvPr>
+        </p:nvSpPr>
+        <p:spPr/>
+        <p:txBody>
+          <a:bodyPr/>
+          <a:lstStyle/>
+          <a:p>
+            <a:r>
+              <a:rPr lang="en-US" dirty="0"/>
+              <a:t>Learn more about these topics</a:t>
+            </a:r>
+            <a:endParaRPr lang="en-GB" dirty="0"/>
+          </a:p>
+        </p:txBody>
+      </p:sp>
+      <p:sp>
+        <p:nvSpPr>
+          <p:cNvPr id="3" name="Content Placeholder 2">
+            <a:extLst>
+              <a:ext uri="{FF2B5EF4-FFF2-40B4-BE49-F238E27FC236}">
+                <a16:creationId xmlns:a16="http://schemas.microsoft.com/office/drawing/2014/main" id="{C71C8DD6-14D1-44DF-9843-EFEDF44E39A2}"/>
+              </a:ext>
+            </a:extLst>
+          </p:cNvPr>
+          <p:cNvSpPr>
+            <a:spLocks noGrp="1"/>
+          </p:cNvSpPr>
+          <p:nvPr>
+            <p:ph idx="1"/>
+          </p:nvPr>
+        </p:nvSpPr>
+        <p:spPr>
+          <a:xfrm>
+            <a:off x="838200" y="1825624"/>
+            <a:ext cx="10515600" cy="5032375"/>
+          </a:xfrm>
+        </p:spPr>
+        <p:txBody>
+          <a:bodyPr>
+            <a:normAutofit/>
+          </a:bodyPr>
+          <a:lstStyle/>
+          <a:p>
+            <a:pPr marL="0" indent="0">
+              <a:buNone/>
+            </a:pPr>
+            <a:r>
+              <a:rPr lang="en-US" dirty="0"/>
+              <a:t>Out of class, supporting papers, for those of you who are curious.</a:t>
+            </a:r>
+          </a:p>
+          <a:p>
+            <a:endParaRPr lang="en-US" dirty="0"/>
+          </a:p>
+          <a:p>
+            <a:r>
+              <a:rPr lang="en-US" dirty="0"/>
+              <a:t>[XXX] XXX</a:t>
+            </a:r>
+          </a:p>
+          <a:p>
+            <a:endParaRPr lang="en-GB" dirty="0"/>
+          </a:p>
+        </p:txBody>
+      </p:sp>
+    </p:spTree>
+    <p:extLst>
+      <p:ext uri="{BB962C8B-B14F-4D97-AF65-F5344CB8AC3E}">
+        <p14:creationId xmlns:p14="http://schemas.microsoft.com/office/powerpoint/2010/main" val="3880949074"/>
+      </p:ext>
+    </p:extLst>
+  </p:cSld>
+  <p:clrMapOvr>
+    <a:masterClrMapping/>
+  </p:clrMapOvr>
+</p:sld>
+</file>
+
+<file path=ppt/slides/slide44.xml><?xml version="1.0" encoding="utf-8"?>
+<p:sld xmlns:a="http://schemas.openxmlformats.org/drawingml/2006/main" xmlns:r="http://schemas.openxmlformats.org/officeDocument/2006/relationships" xmlns:p="http://schemas.openxmlformats.org/presentationml/2006/main">
+  <p:cSld>
+    <p:spTree>
+      <p:nvGrpSpPr>
+        <p:cNvPr id="1" name=""/>
+        <p:cNvGrpSpPr/>
+        <p:nvPr/>
+      </p:nvGrpSpPr>
+      <p:grpSpPr>
+        <a:xfrm>
+          <a:off x="0" y="0"/>
+          <a:ext cx="0" cy="0"/>
+          <a:chOff x="0" y="0"/>
+          <a:chExt cx="0" cy="0"/>
+        </a:xfrm>
+      </p:grpSpPr>
+      <p:sp>
+        <p:nvSpPr>
+          <p:cNvPr id="2" name="Title 1">
+            <a:extLst>
+              <a:ext uri="{FF2B5EF4-FFF2-40B4-BE49-F238E27FC236}">
+                <a16:creationId xmlns:a16="http://schemas.microsoft.com/office/drawing/2014/main" id="{999B9715-ECD1-470D-B523-53C9DD5C7678}"/>
+              </a:ext>
+            </a:extLst>
+          </p:cNvPr>
+          <p:cNvSpPr>
+            <a:spLocks noGrp="1"/>
+          </p:cNvSpPr>
+          <p:nvPr>
+            <p:ph type="title"/>
+          </p:nvPr>
+        </p:nvSpPr>
+        <p:spPr/>
+        <p:txBody>
+          <a:bodyPr/>
+          <a:lstStyle/>
+          <a:p>
+            <a:r>
+              <a:rPr lang="en-US" dirty="0"/>
+              <a:t>Learn more about these topics</a:t>
+            </a:r>
+            <a:endParaRPr lang="en-GB" dirty="0"/>
+          </a:p>
+        </p:txBody>
+      </p:sp>
+      <p:sp>
+        <p:nvSpPr>
+          <p:cNvPr id="5" name="Content Placeholder 4">
+            <a:extLst>
+              <a:ext uri="{FF2B5EF4-FFF2-40B4-BE49-F238E27FC236}">
+                <a16:creationId xmlns:a16="http://schemas.microsoft.com/office/drawing/2014/main" id="{7D0CB248-82F3-414A-84E4-14EF63C7FB27}"/>
+              </a:ext>
+            </a:extLst>
+          </p:cNvPr>
+          <p:cNvSpPr>
+            <a:spLocks noGrp="1"/>
+          </p:cNvSpPr>
+          <p:nvPr>
+            <p:ph idx="1"/>
+          </p:nvPr>
+        </p:nvSpPr>
+        <p:spPr>
+          <a:xfrm>
+            <a:off x="838200" y="1825624"/>
+            <a:ext cx="10515600" cy="5032375"/>
+          </a:xfrm>
+        </p:spPr>
+        <p:txBody>
+          <a:bodyPr>
+            <a:normAutofit/>
+          </a:bodyPr>
+          <a:lstStyle/>
+          <a:p>
+            <a:pPr marL="0" indent="0">
+              <a:buNone/>
+            </a:pPr>
+            <a:r>
+              <a:rPr lang="en-GB" dirty="0"/>
+              <a:t>Some extra (easy) reading and videos for those of you who are curious.</a:t>
+            </a:r>
+          </a:p>
+          <a:p>
+            <a:r>
+              <a:rPr lang="en-GB" dirty="0"/>
+              <a:t>[XXX] XXX</a:t>
+            </a:r>
+          </a:p>
+          <a:p>
+            <a:endParaRPr lang="en-GB" dirty="0"/>
+          </a:p>
+        </p:txBody>
+      </p:sp>
+    </p:spTree>
+    <p:extLst>
+      <p:ext uri="{BB962C8B-B14F-4D97-AF65-F5344CB8AC3E}">
+        <p14:creationId xmlns:p14="http://schemas.microsoft.com/office/powerpoint/2010/main" val="1893873068"/>
       </p:ext>
     </p:extLst>
   </p:cSld>

</xml_diff>